<commit_message>
changes made and added to changes branch
</commit_message>
<xml_diff>
--- a/user login process.pptx
+++ b/user login process.pptx
@@ -3450,7 +3450,7 @@
             <a:pPr algn="ctr"/>
             <a:r>
               <a:rPr lang="en-US" sz="1100" dirty="0"/>
-              <a:t>item</a:t>
+              <a:t>Item changed</a:t>
             </a:r>
             <a:endParaRPr lang="en-GB" sz="1100" dirty="0"/>
           </a:p>
@@ -3500,7 +3500,7 @@
             <a:pPr algn="ctr"/>
             <a:r>
               <a:rPr lang="en-US" sz="1100" dirty="0"/>
-              <a:t>item</a:t>
+              <a:t>Item changed</a:t>
             </a:r>
             <a:endParaRPr lang="en-GB" sz="1100" dirty="0"/>
           </a:p>
@@ -3550,7 +3550,7 @@
             <a:pPr algn="ctr"/>
             <a:r>
               <a:rPr lang="en-US" sz="1100" dirty="0"/>
-              <a:t>item</a:t>
+              <a:t>Item changed</a:t>
             </a:r>
             <a:endParaRPr lang="en-GB" sz="1100" dirty="0"/>
           </a:p>
@@ -4234,8 +4234,8 @@
           <a:p>
             <a:pPr algn="ctr"/>
             <a:r>
-              <a:rPr lang="en-US" sz="1100" dirty="0"/>
-              <a:t>item</a:t>
+              <a:rPr lang="en-US" sz="1100"/>
+              <a:t>Item changed</a:t>
             </a:r>
             <a:endParaRPr lang="en-GB" sz="1100" dirty="0"/>
           </a:p>

</xml_diff>